<commit_message>
added time to code for collections
</commit_message>
<xml_diff>
--- a/Slides/ch3_Collections.pptx
+++ b/Slides/ch3_Collections.pptx
@@ -5,7 +5,7 @@
     <p:sldMasterId id="2147483708" r:id="rId1"/>
   </p:sldMasterIdLst>
   <p:notesMasterIdLst>
-    <p:notesMasterId r:id="rId19"/>
+    <p:notesMasterId r:id="rId20"/>
   </p:notesMasterIdLst>
   <p:sldIdLst>
     <p:sldId id="256" r:id="rId2"/>
@@ -24,7 +24,8 @@
     <p:sldId id="273" r:id="rId15"/>
     <p:sldId id="278" r:id="rId16"/>
     <p:sldId id="279" r:id="rId17"/>
-    <p:sldId id="260" r:id="rId18"/>
+    <p:sldId id="280" r:id="rId18"/>
+    <p:sldId id="260" r:id="rId19"/>
   </p:sldIdLst>
   <p:sldSz cx="12192000" cy="6858000"/>
   <p:notesSz cx="6858000" cy="9144000"/>
@@ -6882,6 +6883,188 @@
   <p:cSld>
     <p:spTree>
       <p:nvGrpSpPr>
+        <p:cNvPr id="1" name="">
+          <a:extLst>
+            <a:ext uri="{FF2B5EF4-FFF2-40B4-BE49-F238E27FC236}">
+              <a16:creationId xmlns:a16="http://schemas.microsoft.com/office/drawing/2014/main" id="{CFC63BCF-18CF-324D-7143-A37A2AFE3382}"/>
+            </a:ext>
+          </a:extLst>
+        </p:cNvPr>
+        <p:cNvGrpSpPr/>
+        <p:nvPr/>
+      </p:nvGrpSpPr>
+      <p:grpSpPr>
+        <a:xfrm>
+          <a:off x="0" y="0"/>
+          <a:ext cx="0" cy="0"/>
+          <a:chOff x="0" y="0"/>
+          <a:chExt cx="0" cy="0"/>
+        </a:xfrm>
+      </p:grpSpPr>
+      <p:sp>
+        <p:nvSpPr>
+          <p:cNvPr id="4" name="TextBox 3">
+            <a:extLst>
+              <a:ext uri="{FF2B5EF4-FFF2-40B4-BE49-F238E27FC236}">
+                <a16:creationId xmlns:a16="http://schemas.microsoft.com/office/drawing/2014/main" id="{9DA7FBA2-72FF-0EF0-9787-03130C24EA47}"/>
+              </a:ext>
+            </a:extLst>
+          </p:cNvPr>
+          <p:cNvSpPr txBox="1"/>
+          <p:nvPr/>
+        </p:nvSpPr>
+        <p:spPr>
+          <a:xfrm>
+            <a:off x="466146" y="761134"/>
+            <a:ext cx="11220543" cy="1569660"/>
+          </a:xfrm>
+          <a:prstGeom prst="rect">
+            <a:avLst/>
+          </a:prstGeom>
+          <a:noFill/>
+        </p:spPr>
+        <p:txBody>
+          <a:bodyPr wrap="square" rtlCol="0">
+            <a:spAutoFit/>
+          </a:bodyPr>
+          <a:lstStyle/>
+          <a:p>
+            <a:pPr algn="ctr"/>
+            <a:r>
+              <a:rPr lang="en-US" sz="4800" dirty="0">
+                <a:solidFill>
+                  <a:schemeClr val="bg1"/>
+                </a:solidFill>
+              </a:rPr>
+              <a:t>Time to Code</a:t>
+            </a:r>
+          </a:p>
+          <a:p>
+            <a:pPr algn="ctr"/>
+            <a:endParaRPr lang="en-US" sz="4800" dirty="0">
+              <a:solidFill>
+                <a:schemeClr val="bg1"/>
+              </a:solidFill>
+            </a:endParaRPr>
+          </a:p>
+        </p:txBody>
+      </p:sp>
+      <p:sp>
+        <p:nvSpPr>
+          <p:cNvPr id="5" name="TextBox 4">
+            <a:extLst>
+              <a:ext uri="{FF2B5EF4-FFF2-40B4-BE49-F238E27FC236}">
+                <a16:creationId xmlns:a16="http://schemas.microsoft.com/office/drawing/2014/main" id="{E5751B64-DBB9-7A89-80DD-356B07F1FB51}"/>
+              </a:ext>
+            </a:extLst>
+          </p:cNvPr>
+          <p:cNvSpPr txBox="1"/>
+          <p:nvPr/>
+        </p:nvSpPr>
+        <p:spPr>
+          <a:xfrm>
+            <a:off x="466147" y="2076348"/>
+            <a:ext cx="11144661" cy="1200329"/>
+          </a:xfrm>
+          <a:prstGeom prst="rect">
+            <a:avLst/>
+          </a:prstGeom>
+          <a:noFill/>
+        </p:spPr>
+        <p:txBody>
+          <a:bodyPr wrap="square" rtlCol="0">
+            <a:spAutoFit/>
+          </a:bodyPr>
+          <a:lstStyle/>
+          <a:p>
+            <a:pPr algn="just"/>
+            <a:r>
+              <a:rPr lang="en-US" sz="2400" b="1" dirty="0"/>
+              <a:t>Bank with Collections:</a:t>
+            </a:r>
+          </a:p>
+          <a:p>
+            <a:pPr marL="342900" indent="-342900" algn="just">
+              <a:buFont typeface="Arial" panose="020B0604020202020204" pitchFamily="34" charset="0"/>
+              <a:buChar char="•"/>
+            </a:pPr>
+            <a:r>
+              <a:rPr lang="en-US" sz="2400" dirty="0"/>
+              <a:t> Modify the bank system from the last lecture to use Lists or HashMap for storing accounts.</a:t>
+            </a:r>
+          </a:p>
+        </p:txBody>
+      </p:sp>
+      <p:sp>
+        <p:nvSpPr>
+          <p:cNvPr id="2" name="Slide Number Placeholder 1">
+            <a:extLst>
+              <a:ext uri="{FF2B5EF4-FFF2-40B4-BE49-F238E27FC236}">
+                <a16:creationId xmlns:a16="http://schemas.microsoft.com/office/drawing/2014/main" id="{A9961A5F-1E89-E4A7-BBBB-3C259AAE297C}"/>
+              </a:ext>
+            </a:extLst>
+          </p:cNvPr>
+          <p:cNvSpPr>
+            <a:spLocks noGrp="1"/>
+          </p:cNvSpPr>
+          <p:nvPr>
+            <p:ph type="sldNum" sz="quarter" idx="12"/>
+          </p:nvPr>
+        </p:nvSpPr>
+        <p:spPr/>
+        <p:txBody>
+          <a:bodyPr/>
+          <a:lstStyle/>
+          <a:p>
+            <a:fld id="{D57F1E4F-1CFF-5643-939E-217C01CDF565}" type="slidenum">
+              <a:rPr lang="en-US" smtClean="0"/>
+              <a:pPr/>
+              <a:t>17</a:t>
+            </a:fld>
+            <a:endParaRPr lang="en-US" dirty="0"/>
+          </a:p>
+        </p:txBody>
+      </p:sp>
+    </p:spTree>
+    <p:extLst>
+      <p:ext uri="{BB962C8B-B14F-4D97-AF65-F5344CB8AC3E}">
+        <p14:creationId xmlns:p14="http://schemas.microsoft.com/office/powerpoint/2010/main" val="2264481444"/>
+      </p:ext>
+    </p:extLst>
+  </p:cSld>
+  <p:clrMapOvr>
+    <a:masterClrMapping/>
+  </p:clrMapOvr>
+  <mc:AlternateContent xmlns:mc="http://schemas.openxmlformats.org/markup-compatibility/2006" xmlns:p14="http://schemas.microsoft.com/office/powerpoint/2010/main">
+    <mc:Choice Requires="p14">
+      <p:transition spd="slow">
+        <p14:reveal/>
+        <p:sndAc>
+          <p:stSnd>
+            <p:snd r:embed="rId2" name="click.wav"/>
+          </p:stSnd>
+        </p:sndAc>
+      </p:transition>
+    </mc:Choice>
+    <mc:Fallback xmlns="">
+      <p:transition spd="slow">
+        <p:fade/>
+        <p:sndAc>
+          <p:stSnd>
+            <p:snd r:embed="rId4" name="click.wav"/>
+          </p:stSnd>
+        </p:sndAc>
+      </p:transition>
+    </mc:Fallback>
+  </mc:AlternateContent>
+</p:sld>
+</file>
+
+<file path=ppt/slides/slide18.xml><?xml version="1.0" encoding="utf-8"?>
+<p:sld xmlns:a="http://schemas.openxmlformats.org/drawingml/2006/main" xmlns:r="http://schemas.openxmlformats.org/officeDocument/2006/relationships" xmlns:p="http://schemas.openxmlformats.org/presentationml/2006/main">
+  <p:cSld>
+    <p:spTree>
+      <p:nvGrpSpPr>
         <p:cNvPr id="1" name=""/>
         <p:cNvGrpSpPr/>
         <p:nvPr/>
@@ -6953,7 +7136,7 @@
                 </a:solidFill>
               </a:rPr>
               <a:pPr/>
-              <a:t>17</a:t>
+              <a:t>18</a:t>
             </a:fld>
             <a:endParaRPr lang="en-US" dirty="0">
               <a:solidFill>

</xml_diff>